<commit_message>
Worked on the documentation.
</commit_message>
<xml_diff>
--- a/Extra Files/Flowchart.pptx
+++ b/Extra Files/Flowchart.pptx
@@ -5,10 +5,11 @@
     <p:sldMasterId id="2147483648" r:id="rId1"/>
   </p:sldMasterIdLst>
   <p:notesMasterIdLst>
-    <p:notesMasterId r:id="rId3"/>
+    <p:notesMasterId r:id="rId4"/>
   </p:notesMasterIdLst>
   <p:sldIdLst>
     <p:sldId id="256" r:id="rId2"/>
+    <p:sldId id="257" r:id="rId3"/>
   </p:sldIdLst>
   <p:sldSz cx="9144000" cy="6858000" type="screen4x3"/>
   <p:notesSz cx="6858000" cy="9144000"/>
@@ -192,7 +193,7 @@
           <a:p>
             <a:fld id="{8DE803A9-C75E-7546-8C85-D34FC6862F99}" type="datetimeFigureOut">
               <a:rPr lang="en-US" smtClean="0"/>
-              <a:t>20/05/14</a:t>
+              <a:t>25/05/14</a:t>
             </a:fld>
             <a:endParaRPr lang="en-US"/>
           </a:p>
@@ -725,7 +726,7 @@
           <a:p>
             <a:fld id="{6FF53F98-637D-414A-97BA-1FE442A38F56}" type="datetimeFigureOut">
               <a:rPr lang="en-US" smtClean="0"/>
-              <a:t>20/05/14</a:t>
+              <a:t>25/05/14</a:t>
             </a:fld>
             <a:endParaRPr lang="en-US"/>
           </a:p>
@@ -895,7 +896,7 @@
           <a:p>
             <a:fld id="{6FF53F98-637D-414A-97BA-1FE442A38F56}" type="datetimeFigureOut">
               <a:rPr lang="en-US" smtClean="0"/>
-              <a:t>20/05/14</a:t>
+              <a:t>25/05/14</a:t>
             </a:fld>
             <a:endParaRPr lang="en-US"/>
           </a:p>
@@ -1075,7 +1076,7 @@
           <a:p>
             <a:fld id="{6FF53F98-637D-414A-97BA-1FE442A38F56}" type="datetimeFigureOut">
               <a:rPr lang="en-US" smtClean="0"/>
-              <a:t>20/05/14</a:t>
+              <a:t>25/05/14</a:t>
             </a:fld>
             <a:endParaRPr lang="en-US"/>
           </a:p>
@@ -1245,7 +1246,7 @@
           <a:p>
             <a:fld id="{6FF53F98-637D-414A-97BA-1FE442A38F56}" type="datetimeFigureOut">
               <a:rPr lang="en-US" smtClean="0"/>
-              <a:t>20/05/14</a:t>
+              <a:t>25/05/14</a:t>
             </a:fld>
             <a:endParaRPr lang="en-US"/>
           </a:p>
@@ -1491,7 +1492,7 @@
           <a:p>
             <a:fld id="{6FF53F98-637D-414A-97BA-1FE442A38F56}" type="datetimeFigureOut">
               <a:rPr lang="en-US" smtClean="0"/>
-              <a:t>20/05/14</a:t>
+              <a:t>25/05/14</a:t>
             </a:fld>
             <a:endParaRPr lang="en-US"/>
           </a:p>
@@ -1779,7 +1780,7 @@
           <a:p>
             <a:fld id="{6FF53F98-637D-414A-97BA-1FE442A38F56}" type="datetimeFigureOut">
               <a:rPr lang="en-US" smtClean="0"/>
-              <a:t>20/05/14</a:t>
+              <a:t>25/05/14</a:t>
             </a:fld>
             <a:endParaRPr lang="en-US"/>
           </a:p>
@@ -2201,7 +2202,7 @@
           <a:p>
             <a:fld id="{6FF53F98-637D-414A-97BA-1FE442A38F56}" type="datetimeFigureOut">
               <a:rPr lang="en-US" smtClean="0"/>
-              <a:t>20/05/14</a:t>
+              <a:t>25/05/14</a:t>
             </a:fld>
             <a:endParaRPr lang="en-US"/>
           </a:p>
@@ -2319,7 +2320,7 @@
           <a:p>
             <a:fld id="{6FF53F98-637D-414A-97BA-1FE442A38F56}" type="datetimeFigureOut">
               <a:rPr lang="en-US" smtClean="0"/>
-              <a:t>20/05/14</a:t>
+              <a:t>25/05/14</a:t>
             </a:fld>
             <a:endParaRPr lang="en-US"/>
           </a:p>
@@ -2414,7 +2415,7 @@
           <a:p>
             <a:fld id="{6FF53F98-637D-414A-97BA-1FE442A38F56}" type="datetimeFigureOut">
               <a:rPr lang="en-US" smtClean="0"/>
-              <a:t>20/05/14</a:t>
+              <a:t>25/05/14</a:t>
             </a:fld>
             <a:endParaRPr lang="en-US"/>
           </a:p>
@@ -2691,7 +2692,7 @@
           <a:p>
             <a:fld id="{6FF53F98-637D-414A-97BA-1FE442A38F56}" type="datetimeFigureOut">
               <a:rPr lang="en-US" smtClean="0"/>
-              <a:t>20/05/14</a:t>
+              <a:t>25/05/14</a:t>
             </a:fld>
             <a:endParaRPr lang="en-US"/>
           </a:p>
@@ -2944,7 +2945,7 @@
           <a:p>
             <a:fld id="{6FF53F98-637D-414A-97BA-1FE442A38F56}" type="datetimeFigureOut">
               <a:rPr lang="en-US" smtClean="0"/>
-              <a:t>20/05/14</a:t>
+              <a:t>25/05/14</a:t>
             </a:fld>
             <a:endParaRPr lang="en-US"/>
           </a:p>
@@ -3157,7 +3158,7 @@
           <a:p>
             <a:fld id="{6FF53F98-637D-414A-97BA-1FE442A38F56}" type="datetimeFigureOut">
               <a:rPr lang="en-US" smtClean="0"/>
-              <a:t>20/05/14</a:t>
+              <a:t>25/05/14</a:t>
             </a:fld>
             <a:endParaRPr lang="en-US"/>
           </a:p>
@@ -3540,10 +3541,10 @@
         </p:nvGrpSpPr>
         <p:grpSpPr>
           <a:xfrm>
-            <a:off x="936550" y="105106"/>
-            <a:ext cx="7004613" cy="4782530"/>
+            <a:off x="947675" y="119097"/>
+            <a:ext cx="7255010" cy="4782530"/>
             <a:chOff x="936550" y="340206"/>
-            <a:chExt cx="7004613" cy="4782530"/>
+            <a:chExt cx="7255010" cy="4782530"/>
           </a:xfrm>
         </p:grpSpPr>
         <p:grpSp>
@@ -3555,9 +3556,9 @@
           <p:grpSpPr>
             <a:xfrm>
               <a:off x="936550" y="340206"/>
-              <a:ext cx="7004613" cy="3426409"/>
+              <a:ext cx="7255010" cy="3426409"/>
               <a:chOff x="936550" y="340206"/>
-              <a:chExt cx="7004613" cy="3426409"/>
+              <a:chExt cx="7255010" cy="3426409"/>
             </a:xfrm>
           </p:grpSpPr>
           <p:grpSp>
@@ -3569,9 +3570,9 @@
             <p:grpSpPr>
               <a:xfrm>
                 <a:off x="936550" y="340206"/>
-                <a:ext cx="7004613" cy="3426409"/>
+                <a:ext cx="7255010" cy="3426409"/>
                 <a:chOff x="936550" y="340206"/>
-                <a:chExt cx="7004613" cy="3426409"/>
+                <a:chExt cx="7255010" cy="3426409"/>
               </a:xfrm>
             </p:grpSpPr>
             <p:grpSp>
@@ -3906,9 +3907,9 @@
               <p:grpSpPr>
                 <a:xfrm>
                   <a:off x="970322" y="1804756"/>
-                  <a:ext cx="6290807" cy="1961859"/>
+                  <a:ext cx="7221238" cy="1961859"/>
                   <a:chOff x="970322" y="1804756"/>
-                  <a:chExt cx="6290807" cy="1961859"/>
+                  <a:chExt cx="7221238" cy="1961859"/>
                 </a:xfrm>
               </p:grpSpPr>
               <p:grpSp>
@@ -3920,9 +3921,9 @@
                 <p:grpSpPr>
                   <a:xfrm>
                     <a:off x="1773868" y="1804756"/>
-                    <a:ext cx="4678386" cy="809859"/>
+                    <a:ext cx="6417692" cy="809859"/>
                     <a:chOff x="1773868" y="1804756"/>
-                    <a:chExt cx="4678386" cy="809859"/>
+                    <a:chExt cx="6417692" cy="809859"/>
                   </a:xfrm>
                 </p:grpSpPr>
                 <p:cxnSp>
@@ -3932,9 +3933,9 @@
                     <p:nvPr/>
                   </p:nvCxnSpPr>
                   <p:spPr>
-                    <a:xfrm flipV="1">
-                      <a:off x="1773868" y="2131962"/>
-                      <a:ext cx="4678386" cy="11340"/>
+                    <a:xfrm>
+                      <a:off x="1773868" y="2143302"/>
+                      <a:ext cx="6417692" cy="0"/>
                     </a:xfrm>
                     <a:prstGeom prst="line">
                       <a:avLst/>
@@ -4086,7 +4087,7 @@
                 <p:spPr>
                   <a:xfrm>
                     <a:off x="2863397" y="1804756"/>
-                    <a:ext cx="3052037" cy="323165"/>
+                    <a:ext cx="2943929" cy="323165"/>
                   </a:xfrm>
                   <a:prstGeom prst="rect">
                     <a:avLst/>
@@ -4101,7 +4102,19 @@
                   <a:p>
                     <a:r>
                       <a:rPr lang="en-US" sz="1500" dirty="0" smtClean="0"/>
-                      <a:t>User Scrolls to choose specific guide</a:t>
+                      <a:t>User </a:t>
+                    </a:r>
+                    <a:r>
+                      <a:rPr lang="en-US" sz="1500" dirty="0" err="1" smtClean="0"/>
+                      <a:t>scrollsto</a:t>
+                    </a:r>
+                    <a:r>
+                      <a:rPr lang="en-US" sz="1500" dirty="0" smtClean="0"/>
+                      <a:t> </a:t>
+                    </a:r>
+                    <a:r>
+                      <a:rPr lang="en-US" sz="1500" dirty="0" smtClean="0"/>
+                      <a:t>choose specific guide</a:t>
                     </a:r>
                     <a:endParaRPr lang="en-US" sz="1500" dirty="0"/>
                   </a:p>
@@ -4387,7 +4400,7 @@
             </p:nvSpPr>
             <p:spPr>
               <a:xfrm>
-                <a:off x="3661502" y="374952"/>
+                <a:off x="2437344" y="354197"/>
                 <a:ext cx="1331690" cy="323165"/>
               </a:xfrm>
               <a:prstGeom prst="rect">
@@ -4556,7 +4569,7 @@
         </p:nvCxnSpPr>
         <p:spPr>
           <a:xfrm>
-            <a:off x="1780322" y="4887636"/>
+            <a:off x="1791447" y="4901627"/>
             <a:ext cx="0" cy="717479"/>
           </a:xfrm>
           <a:prstGeom prst="straightConnector1">
@@ -4932,10 +4945,2412 @@
           </a:p>
         </p:txBody>
       </p:sp>
+      <p:sp>
+        <p:nvSpPr>
+          <p:cNvPr id="47" name="Rectangle 46"/>
+          <p:cNvSpPr/>
+          <p:nvPr/>
+        </p:nvSpPr>
+        <p:spPr>
+          <a:xfrm>
+            <a:off x="3556867" y="443070"/>
+            <a:ext cx="1620000" cy="1152000"/>
+          </a:xfrm>
+          <a:prstGeom prst="rect">
+            <a:avLst/>
+          </a:prstGeom>
+          <a:noFill/>
+          <a:ln>
+            <a:solidFill>
+              <a:schemeClr val="tx1"/>
+            </a:solidFill>
+          </a:ln>
+        </p:spPr>
+        <p:style>
+          <a:lnRef idx="1">
+            <a:schemeClr val="accent1"/>
+          </a:lnRef>
+          <a:fillRef idx="3">
+            <a:schemeClr val="accent1"/>
+          </a:fillRef>
+          <a:effectRef idx="2">
+            <a:schemeClr val="accent1"/>
+          </a:effectRef>
+          <a:fontRef idx="minor">
+            <a:schemeClr val="lt1"/>
+          </a:fontRef>
+        </p:style>
+        <p:txBody>
+          <a:bodyPr rtlCol="0" anchor="ctr"/>
+          <a:lstStyle/>
+          <a:p>
+            <a:pPr algn="ctr"/>
+            <a:endParaRPr lang="en-US"/>
+          </a:p>
+        </p:txBody>
+      </p:sp>
+      <p:sp>
+        <p:nvSpPr>
+          <p:cNvPr id="2" name="TextBox 1"/>
+          <p:cNvSpPr txBox="1"/>
+          <p:nvPr/>
+        </p:nvSpPr>
+        <p:spPr>
+          <a:xfrm>
+            <a:off x="3564151" y="787268"/>
+            <a:ext cx="1612716" cy="369332"/>
+          </a:xfrm>
+          <a:prstGeom prst="rect">
+            <a:avLst/>
+          </a:prstGeom>
+          <a:noFill/>
+        </p:spPr>
+        <p:txBody>
+          <a:bodyPr wrap="none" rtlCol="0">
+            <a:spAutoFit/>
+          </a:bodyPr>
+          <a:lstStyle/>
+          <a:p>
+            <a:r>
+              <a:rPr lang="en-US" dirty="0" smtClean="0"/>
+              <a:t>Getting Started</a:t>
+            </a:r>
+          </a:p>
+        </p:txBody>
+      </p:sp>
+      <p:cxnSp>
+        <p:nvCxnSpPr>
+          <p:cNvPr id="49" name="Straight Arrow Connector 48"/>
+          <p:cNvCxnSpPr/>
+          <p:nvPr/>
+        </p:nvCxnSpPr>
+        <p:spPr>
+          <a:xfrm>
+            <a:off x="4315326" y="119097"/>
+            <a:ext cx="0" cy="317527"/>
+          </a:xfrm>
+          <a:prstGeom prst="straightConnector1">
+            <a:avLst/>
+          </a:prstGeom>
+          <a:ln>
+            <a:solidFill>
+              <a:srgbClr val="000000"/>
+            </a:solidFill>
+            <a:tailEnd type="arrow"/>
+          </a:ln>
+        </p:spPr>
+        <p:style>
+          <a:lnRef idx="2">
+            <a:schemeClr val="accent1"/>
+          </a:lnRef>
+          <a:fillRef idx="0">
+            <a:schemeClr val="accent1"/>
+          </a:fillRef>
+          <a:effectRef idx="1">
+            <a:schemeClr val="accent1"/>
+          </a:effectRef>
+          <a:fontRef idx="minor">
+            <a:schemeClr val="tx1"/>
+          </a:fontRef>
+        </p:style>
+      </p:cxnSp>
+      <p:sp>
+        <p:nvSpPr>
+          <p:cNvPr id="54" name="Diamond 53"/>
+          <p:cNvSpPr/>
+          <p:nvPr/>
+        </p:nvSpPr>
+        <p:spPr>
+          <a:xfrm>
+            <a:off x="7381560" y="2379515"/>
+            <a:ext cx="1620000" cy="1152000"/>
+          </a:xfrm>
+          <a:prstGeom prst="diamond">
+            <a:avLst/>
+          </a:prstGeom>
+          <a:noFill/>
+          <a:ln>
+            <a:solidFill>
+              <a:srgbClr val="000000"/>
+            </a:solidFill>
+          </a:ln>
+        </p:spPr>
+        <p:style>
+          <a:lnRef idx="1">
+            <a:schemeClr val="accent1"/>
+          </a:lnRef>
+          <a:fillRef idx="3">
+            <a:schemeClr val="accent1"/>
+          </a:fillRef>
+          <a:effectRef idx="2">
+            <a:schemeClr val="accent1"/>
+          </a:effectRef>
+          <a:fontRef idx="minor">
+            <a:schemeClr val="lt1"/>
+          </a:fontRef>
+        </p:style>
+        <p:txBody>
+          <a:bodyPr rtlCol="0" anchor="ctr"/>
+          <a:lstStyle/>
+          <a:p>
+            <a:pPr algn="ctr"/>
+            <a:endParaRPr lang="en-US"/>
+          </a:p>
+        </p:txBody>
+      </p:sp>
+      <p:cxnSp>
+        <p:nvCxnSpPr>
+          <p:cNvPr id="58" name="Straight Arrow Connector 57"/>
+          <p:cNvCxnSpPr/>
+          <p:nvPr/>
+        </p:nvCxnSpPr>
+        <p:spPr>
+          <a:xfrm flipH="1">
+            <a:off x="8191560" y="1892821"/>
+            <a:ext cx="1125" cy="482653"/>
+          </a:xfrm>
+          <a:prstGeom prst="straightConnector1">
+            <a:avLst/>
+          </a:prstGeom>
+          <a:ln>
+            <a:solidFill>
+              <a:srgbClr val="000000"/>
+            </a:solidFill>
+            <a:tailEnd type="arrow"/>
+          </a:ln>
+        </p:spPr>
+        <p:style>
+          <a:lnRef idx="2">
+            <a:schemeClr val="accent1"/>
+          </a:lnRef>
+          <a:fillRef idx="0">
+            <a:schemeClr val="accent1"/>
+          </a:fillRef>
+          <a:effectRef idx="1">
+            <a:schemeClr val="accent1"/>
+          </a:effectRef>
+          <a:fontRef idx="minor">
+            <a:schemeClr val="tx1"/>
+          </a:fontRef>
+        </p:style>
+      </p:cxnSp>
+      <p:sp>
+        <p:nvSpPr>
+          <p:cNvPr id="60" name="TextBox 59"/>
+          <p:cNvSpPr txBox="1"/>
+          <p:nvPr/>
+        </p:nvSpPr>
+        <p:spPr>
+          <a:xfrm>
+            <a:off x="7688168" y="2645547"/>
+            <a:ext cx="1084732" cy="553998"/>
+          </a:xfrm>
+          <a:prstGeom prst="rect">
+            <a:avLst/>
+          </a:prstGeom>
+          <a:noFill/>
+        </p:spPr>
+        <p:txBody>
+          <a:bodyPr wrap="square" rtlCol="0">
+            <a:spAutoFit/>
+          </a:bodyPr>
+          <a:lstStyle/>
+          <a:p>
+            <a:pPr algn="ctr"/>
+            <a:r>
+              <a:rPr lang="en-US" sz="1500" dirty="0" smtClean="0"/>
+              <a:t>Guide on </a:t>
+            </a:r>
+            <a:r>
+              <a:rPr lang="en-US" sz="1500" dirty="0" smtClean="0"/>
+              <a:t>Broccoli</a:t>
+            </a:r>
+            <a:endParaRPr lang="en-US" sz="1500" dirty="0"/>
+          </a:p>
+        </p:txBody>
+      </p:sp>
     </p:spTree>
     <p:extLst>
       <p:ext uri="{BB962C8B-B14F-4D97-AF65-F5344CB8AC3E}">
         <p14:creationId xmlns:p14="http://schemas.microsoft.com/office/powerpoint/2010/main" val="1986511651"/>
+      </p:ext>
+    </p:extLst>
+  </p:cSld>
+  <p:clrMapOvr>
+    <a:masterClrMapping/>
+  </p:clrMapOvr>
+</p:sld>
+</file>
+
+<file path=ppt/slides/slide2.xml><?xml version="1.0" encoding="utf-8"?>
+<p:sld xmlns:a="http://schemas.openxmlformats.org/drawingml/2006/main" xmlns:r="http://schemas.openxmlformats.org/officeDocument/2006/relationships" xmlns:p="http://schemas.openxmlformats.org/presentationml/2006/main">
+  <p:cSld>
+    <p:spTree>
+      <p:nvGrpSpPr>
+        <p:cNvPr id="1" name=""/>
+        <p:cNvGrpSpPr/>
+        <p:nvPr/>
+      </p:nvGrpSpPr>
+      <p:grpSpPr>
+        <a:xfrm>
+          <a:off x="0" y="0"/>
+          <a:ext cx="0" cy="0"/>
+          <a:chOff x="0" y="0"/>
+          <a:chExt cx="0" cy="0"/>
+        </a:xfrm>
+      </p:grpSpPr>
+      <p:sp>
+        <p:nvSpPr>
+          <p:cNvPr id="10" name="TextBox 9"/>
+          <p:cNvSpPr txBox="1"/>
+          <p:nvPr/>
+        </p:nvSpPr>
+        <p:spPr>
+          <a:xfrm>
+            <a:off x="3559981" y="-10346"/>
+            <a:ext cx="1331690" cy="323165"/>
+          </a:xfrm>
+          <a:prstGeom prst="rect">
+            <a:avLst/>
+          </a:prstGeom>
+          <a:noFill/>
+        </p:spPr>
+        <p:txBody>
+          <a:bodyPr wrap="none" rtlCol="0">
+            <a:spAutoFit/>
+          </a:bodyPr>
+          <a:lstStyle/>
+          <a:p>
+            <a:r>
+              <a:rPr lang="en-US" sz="1500" dirty="0" smtClean="0"/>
+              <a:t>Navigation Bar</a:t>
+            </a:r>
+            <a:endParaRPr lang="en-US" sz="1500" dirty="0"/>
+          </a:p>
+        </p:txBody>
+      </p:sp>
+      <p:grpSp>
+        <p:nvGrpSpPr>
+          <p:cNvPr id="38" name="Group 37"/>
+          <p:cNvGrpSpPr/>
+          <p:nvPr/>
+        </p:nvGrpSpPr>
+        <p:grpSpPr>
+          <a:xfrm>
+            <a:off x="1019348" y="2931291"/>
+            <a:ext cx="2980917" cy="1719379"/>
+            <a:chOff x="970322" y="1804756"/>
+            <a:chExt cx="4043546" cy="1961859"/>
+          </a:xfrm>
+        </p:grpSpPr>
+        <p:grpSp>
+          <p:nvGrpSpPr>
+            <p:cNvPr id="39" name="Group 38"/>
+            <p:cNvGrpSpPr/>
+            <p:nvPr/>
+          </p:nvGrpSpPr>
+          <p:grpSpPr>
+            <a:xfrm>
+              <a:off x="1773868" y="1804756"/>
+              <a:ext cx="2430000" cy="809859"/>
+              <a:chOff x="1773868" y="1804756"/>
+              <a:chExt cx="2430000" cy="809859"/>
+            </a:xfrm>
+          </p:grpSpPr>
+          <p:cxnSp>
+            <p:nvCxnSpPr>
+              <p:cNvPr id="50" name="Straight Connector 49"/>
+              <p:cNvCxnSpPr/>
+              <p:nvPr/>
+            </p:nvCxnSpPr>
+            <p:spPr>
+              <a:xfrm>
+                <a:off x="1773868" y="2248475"/>
+                <a:ext cx="2422522" cy="0"/>
+              </a:xfrm>
+              <a:prstGeom prst="line">
+                <a:avLst/>
+              </a:prstGeom>
+              <a:ln>
+                <a:solidFill>
+                  <a:srgbClr val="000000"/>
+                </a:solidFill>
+              </a:ln>
+            </p:spPr>
+            <p:style>
+              <a:lnRef idx="2">
+                <a:schemeClr val="accent1"/>
+              </a:lnRef>
+              <a:fillRef idx="0">
+                <a:schemeClr val="accent1"/>
+              </a:fillRef>
+              <a:effectRef idx="1">
+                <a:schemeClr val="accent1"/>
+              </a:effectRef>
+              <a:fontRef idx="minor">
+                <a:schemeClr val="tx1"/>
+              </a:fontRef>
+            </p:style>
+          </p:cxnSp>
+          <p:cxnSp>
+            <p:nvCxnSpPr>
+              <p:cNvPr id="51" name="Straight Arrow Connector 50"/>
+              <p:cNvCxnSpPr>
+                <a:endCxn id="46" idx="0"/>
+              </p:cNvCxnSpPr>
+              <p:nvPr/>
+            </p:nvCxnSpPr>
+            <p:spPr>
+              <a:xfrm>
+                <a:off x="4196390" y="2248475"/>
+                <a:ext cx="7478" cy="366140"/>
+              </a:xfrm>
+              <a:prstGeom prst="straightConnector1">
+                <a:avLst/>
+              </a:prstGeom>
+              <a:ln>
+                <a:solidFill>
+                  <a:srgbClr val="000000"/>
+                </a:solidFill>
+                <a:tailEnd type="arrow"/>
+              </a:ln>
+            </p:spPr>
+            <p:style>
+              <a:lnRef idx="2">
+                <a:schemeClr val="accent1"/>
+              </a:lnRef>
+              <a:fillRef idx="0">
+                <a:schemeClr val="accent1"/>
+              </a:fillRef>
+              <a:effectRef idx="1">
+                <a:schemeClr val="accent1"/>
+              </a:effectRef>
+              <a:fontRef idx="minor">
+                <a:schemeClr val="tx1"/>
+              </a:fontRef>
+            </p:style>
+          </p:cxnSp>
+          <p:cxnSp>
+            <p:nvCxnSpPr>
+              <p:cNvPr id="53" name="Straight Arrow Connector 52"/>
+              <p:cNvCxnSpPr>
+                <a:endCxn id="48" idx="0"/>
+              </p:cNvCxnSpPr>
+              <p:nvPr/>
+            </p:nvCxnSpPr>
+            <p:spPr>
+              <a:xfrm>
+                <a:off x="1773868" y="1804756"/>
+                <a:ext cx="6454" cy="809859"/>
+              </a:xfrm>
+              <a:prstGeom prst="straightConnector1">
+                <a:avLst/>
+              </a:prstGeom>
+              <a:ln>
+                <a:solidFill>
+                  <a:srgbClr val="000000"/>
+                </a:solidFill>
+                <a:headEnd type="arrow"/>
+                <a:tailEnd type="arrow"/>
+              </a:ln>
+            </p:spPr>
+            <p:style>
+              <a:lnRef idx="2">
+                <a:schemeClr val="accent1"/>
+              </a:lnRef>
+              <a:fillRef idx="0">
+                <a:schemeClr val="accent1"/>
+              </a:fillRef>
+              <a:effectRef idx="1">
+                <a:schemeClr val="accent1"/>
+              </a:effectRef>
+              <a:fontRef idx="minor">
+                <a:schemeClr val="tx1"/>
+              </a:fontRef>
+            </p:style>
+          </p:cxnSp>
+        </p:grpSp>
+        <p:grpSp>
+          <p:nvGrpSpPr>
+            <p:cNvPr id="41" name="Group 40"/>
+            <p:cNvGrpSpPr/>
+            <p:nvPr/>
+          </p:nvGrpSpPr>
+          <p:grpSpPr>
+            <a:xfrm>
+              <a:off x="970322" y="2614615"/>
+              <a:ext cx="1620000" cy="1152000"/>
+              <a:chOff x="970322" y="2614615"/>
+              <a:chExt cx="1620000" cy="1152000"/>
+            </a:xfrm>
+          </p:grpSpPr>
+          <p:sp>
+            <p:nvSpPr>
+              <p:cNvPr id="48" name="Diamond 47"/>
+              <p:cNvSpPr/>
+              <p:nvPr/>
+            </p:nvSpPr>
+            <p:spPr>
+              <a:xfrm>
+                <a:off x="970322" y="2614615"/>
+                <a:ext cx="1620000" cy="1152000"/>
+              </a:xfrm>
+              <a:prstGeom prst="diamond">
+                <a:avLst/>
+              </a:prstGeom>
+              <a:noFill/>
+              <a:ln>
+                <a:solidFill>
+                  <a:srgbClr val="000000"/>
+                </a:solidFill>
+              </a:ln>
+            </p:spPr>
+            <p:style>
+              <a:lnRef idx="1">
+                <a:schemeClr val="accent1"/>
+              </a:lnRef>
+              <a:fillRef idx="3">
+                <a:schemeClr val="accent1"/>
+              </a:fillRef>
+              <a:effectRef idx="2">
+                <a:schemeClr val="accent1"/>
+              </a:effectRef>
+              <a:fontRef idx="minor">
+                <a:schemeClr val="lt1"/>
+              </a:fontRef>
+            </p:style>
+            <p:txBody>
+              <a:bodyPr rtlCol="0" anchor="ctr"/>
+              <a:lstStyle/>
+              <a:p>
+                <a:pPr algn="ctr"/>
+                <a:endParaRPr lang="en-US"/>
+              </a:p>
+            </p:txBody>
+          </p:sp>
+          <p:sp>
+            <p:nvSpPr>
+              <p:cNvPr id="49" name="TextBox 48"/>
+              <p:cNvSpPr txBox="1"/>
+              <p:nvPr/>
+            </p:nvSpPr>
+            <p:spPr>
+              <a:xfrm>
+                <a:off x="1217214" y="2873972"/>
+                <a:ext cx="1084731" cy="579449"/>
+              </a:xfrm>
+              <a:prstGeom prst="rect">
+                <a:avLst/>
+              </a:prstGeom>
+              <a:noFill/>
+            </p:spPr>
+            <p:txBody>
+              <a:bodyPr wrap="square" rtlCol="0">
+                <a:spAutoFit/>
+              </a:bodyPr>
+              <a:lstStyle/>
+              <a:p>
+                <a:pPr algn="ctr"/>
+                <a:r>
+                  <a:rPr lang="en-US" sz="1200" dirty="0" smtClean="0"/>
+                  <a:t>Guide on Carrots</a:t>
+                </a:r>
+                <a:r>
+                  <a:rPr lang="en-US" sz="1500" dirty="0" smtClean="0"/>
+                  <a:t> </a:t>
+                </a:r>
+                <a:endParaRPr lang="en-US" sz="1500" dirty="0"/>
+              </a:p>
+            </p:txBody>
+          </p:sp>
+        </p:grpSp>
+        <p:grpSp>
+          <p:nvGrpSpPr>
+            <p:cNvPr id="42" name="Group 41"/>
+            <p:cNvGrpSpPr/>
+            <p:nvPr/>
+          </p:nvGrpSpPr>
+          <p:grpSpPr>
+            <a:xfrm>
+              <a:off x="3393868" y="2614615"/>
+              <a:ext cx="1620000" cy="1152000"/>
+              <a:chOff x="3393868" y="2614615"/>
+              <a:chExt cx="1620000" cy="1152000"/>
+            </a:xfrm>
+          </p:grpSpPr>
+          <p:sp>
+            <p:nvSpPr>
+              <p:cNvPr id="46" name="Diamond 45"/>
+              <p:cNvSpPr/>
+              <p:nvPr/>
+            </p:nvSpPr>
+            <p:spPr>
+              <a:xfrm>
+                <a:off x="3393868" y="2614615"/>
+                <a:ext cx="1620000" cy="1152000"/>
+              </a:xfrm>
+              <a:prstGeom prst="diamond">
+                <a:avLst/>
+              </a:prstGeom>
+              <a:noFill/>
+              <a:ln>
+                <a:solidFill>
+                  <a:srgbClr val="000000"/>
+                </a:solidFill>
+              </a:ln>
+            </p:spPr>
+            <p:style>
+              <a:lnRef idx="1">
+                <a:schemeClr val="accent1"/>
+              </a:lnRef>
+              <a:fillRef idx="3">
+                <a:schemeClr val="accent1"/>
+              </a:fillRef>
+              <a:effectRef idx="2">
+                <a:schemeClr val="accent1"/>
+              </a:effectRef>
+              <a:fontRef idx="minor">
+                <a:schemeClr val="lt1"/>
+              </a:fontRef>
+            </p:style>
+            <p:txBody>
+              <a:bodyPr rtlCol="0" anchor="ctr"/>
+              <a:lstStyle/>
+              <a:p>
+                <a:pPr algn="ctr"/>
+                <a:endParaRPr lang="en-US"/>
+              </a:p>
+            </p:txBody>
+          </p:sp>
+          <p:sp>
+            <p:nvSpPr>
+              <p:cNvPr id="47" name="TextBox 46"/>
+              <p:cNvSpPr txBox="1"/>
+              <p:nvPr/>
+            </p:nvSpPr>
+            <p:spPr>
+              <a:xfrm>
+                <a:off x="3678373" y="2933820"/>
+                <a:ext cx="1084731" cy="526773"/>
+              </a:xfrm>
+              <a:prstGeom prst="rect">
+                <a:avLst/>
+              </a:prstGeom>
+              <a:noFill/>
+            </p:spPr>
+            <p:txBody>
+              <a:bodyPr wrap="square" rtlCol="0">
+                <a:spAutoFit/>
+              </a:bodyPr>
+              <a:lstStyle/>
+              <a:p>
+                <a:pPr algn="ctr"/>
+                <a:r>
+                  <a:rPr lang="en-US" sz="1200" dirty="0" smtClean="0"/>
+                  <a:t>Guide on Broccoli</a:t>
+                </a:r>
+                <a:endParaRPr lang="en-US" sz="1200" dirty="0"/>
+              </a:p>
+            </p:txBody>
+          </p:sp>
+        </p:grpSp>
+      </p:grpSp>
+      <p:grpSp>
+        <p:nvGrpSpPr>
+          <p:cNvPr id="70" name="Group 69"/>
+          <p:cNvGrpSpPr/>
+          <p:nvPr/>
+        </p:nvGrpSpPr>
+        <p:grpSpPr>
+          <a:xfrm>
+            <a:off x="882420" y="323752"/>
+            <a:ext cx="6995710" cy="1030207"/>
+            <a:chOff x="1069920" y="1782534"/>
+            <a:chExt cx="6995710" cy="1030207"/>
+          </a:xfrm>
+        </p:grpSpPr>
+        <p:cxnSp>
+          <p:nvCxnSpPr>
+            <p:cNvPr id="55" name="Straight Arrow Connector 54"/>
+            <p:cNvCxnSpPr/>
+            <p:nvPr/>
+          </p:nvCxnSpPr>
+          <p:spPr>
+            <a:xfrm>
+              <a:off x="4375824" y="1782534"/>
+              <a:ext cx="0" cy="317527"/>
+            </a:xfrm>
+            <a:prstGeom prst="straightConnector1">
+              <a:avLst/>
+            </a:prstGeom>
+            <a:ln>
+              <a:solidFill>
+                <a:srgbClr val="000000"/>
+              </a:solidFill>
+              <a:tailEnd type="arrow"/>
+            </a:ln>
+          </p:spPr>
+          <p:style>
+            <a:lnRef idx="2">
+              <a:schemeClr val="accent1"/>
+            </a:lnRef>
+            <a:fillRef idx="0">
+              <a:schemeClr val="accent1"/>
+            </a:fillRef>
+            <a:effectRef idx="1">
+              <a:schemeClr val="accent1"/>
+            </a:effectRef>
+            <a:fontRef idx="minor">
+              <a:schemeClr val="tx1"/>
+            </a:fontRef>
+          </p:style>
+        </p:cxnSp>
+        <p:grpSp>
+          <p:nvGrpSpPr>
+            <p:cNvPr id="69" name="Group 68"/>
+            <p:cNvGrpSpPr/>
+            <p:nvPr/>
+          </p:nvGrpSpPr>
+          <p:grpSpPr>
+            <a:xfrm>
+              <a:off x="3585117" y="2100061"/>
+              <a:ext cx="1620000" cy="712680"/>
+              <a:chOff x="3585117" y="2100061"/>
+              <a:chExt cx="1620000" cy="712680"/>
+            </a:xfrm>
+          </p:grpSpPr>
+          <p:sp>
+            <p:nvSpPr>
+              <p:cNvPr id="54" name="Rectangle 53"/>
+              <p:cNvSpPr/>
+              <p:nvPr/>
+            </p:nvSpPr>
+            <p:spPr>
+              <a:xfrm>
+                <a:off x="3585117" y="2100061"/>
+                <a:ext cx="1620000" cy="712680"/>
+              </a:xfrm>
+              <a:prstGeom prst="rect">
+                <a:avLst/>
+              </a:prstGeom>
+              <a:noFill/>
+              <a:ln>
+                <a:solidFill>
+                  <a:schemeClr val="tx1"/>
+                </a:solidFill>
+              </a:ln>
+            </p:spPr>
+            <p:style>
+              <a:lnRef idx="1">
+                <a:schemeClr val="accent1"/>
+              </a:lnRef>
+              <a:fillRef idx="3">
+                <a:schemeClr val="accent1"/>
+              </a:fillRef>
+              <a:effectRef idx="2">
+                <a:schemeClr val="accent1"/>
+              </a:effectRef>
+              <a:fontRef idx="minor">
+                <a:schemeClr val="lt1"/>
+              </a:fontRef>
+            </p:style>
+            <p:txBody>
+              <a:bodyPr rtlCol="0" anchor="ctr"/>
+              <a:lstStyle/>
+              <a:p>
+                <a:pPr algn="ctr"/>
+                <a:endParaRPr lang="en-US"/>
+              </a:p>
+            </p:txBody>
+          </p:sp>
+          <p:sp>
+            <p:nvSpPr>
+              <p:cNvPr id="56" name="Rectangle 55"/>
+              <p:cNvSpPr/>
+              <p:nvPr/>
+            </p:nvSpPr>
+            <p:spPr>
+              <a:xfrm>
+                <a:off x="3641796" y="2120242"/>
+                <a:ext cx="1488541" cy="646331"/>
+              </a:xfrm>
+              <a:prstGeom prst="rect">
+                <a:avLst/>
+              </a:prstGeom>
+            </p:spPr>
+            <p:txBody>
+              <a:bodyPr wrap="square">
+                <a:spAutoFit/>
+              </a:bodyPr>
+              <a:lstStyle/>
+              <a:p>
+                <a:pPr algn="ctr"/>
+                <a:r>
+                  <a:rPr lang="en-US" dirty="0" smtClean="0"/>
+                  <a:t>Getting Started</a:t>
+                </a:r>
+                <a:endParaRPr lang="en-US" dirty="0"/>
+              </a:p>
+            </p:txBody>
+          </p:sp>
+        </p:grpSp>
+        <p:grpSp>
+          <p:nvGrpSpPr>
+            <p:cNvPr id="57" name="Group 56"/>
+            <p:cNvGrpSpPr/>
+            <p:nvPr/>
+          </p:nvGrpSpPr>
+          <p:grpSpPr>
+            <a:xfrm>
+              <a:off x="1069920" y="1782534"/>
+              <a:ext cx="6995710" cy="1030207"/>
+              <a:chOff x="752680" y="345183"/>
+              <a:chExt cx="6995710" cy="1030207"/>
+            </a:xfrm>
+          </p:grpSpPr>
+          <p:grpSp>
+            <p:nvGrpSpPr>
+              <p:cNvPr id="58" name="Group 57"/>
+              <p:cNvGrpSpPr/>
+              <p:nvPr/>
+            </p:nvGrpSpPr>
+            <p:grpSpPr>
+              <a:xfrm>
+                <a:off x="6094370" y="662710"/>
+                <a:ext cx="1654020" cy="712680"/>
+                <a:chOff x="6094370" y="662710"/>
+                <a:chExt cx="1654020" cy="712680"/>
+              </a:xfrm>
+            </p:grpSpPr>
+            <p:sp>
+              <p:nvSpPr>
+                <p:cNvPr id="66" name="Rectangle 65"/>
+                <p:cNvSpPr/>
+                <p:nvPr/>
+              </p:nvSpPr>
+              <p:spPr>
+                <a:xfrm>
+                  <a:off x="6094370" y="662710"/>
+                  <a:ext cx="1620000" cy="712680"/>
+                </a:xfrm>
+                <a:prstGeom prst="rect">
+                  <a:avLst/>
+                </a:prstGeom>
+                <a:noFill/>
+                <a:ln>
+                  <a:solidFill>
+                    <a:schemeClr val="tx1"/>
+                  </a:solidFill>
+                </a:ln>
+              </p:spPr>
+              <p:style>
+                <a:lnRef idx="1">
+                  <a:schemeClr val="accent1"/>
+                </a:lnRef>
+                <a:fillRef idx="3">
+                  <a:schemeClr val="accent1"/>
+                </a:fillRef>
+                <a:effectRef idx="2">
+                  <a:schemeClr val="accent1"/>
+                </a:effectRef>
+                <a:fontRef idx="minor">
+                  <a:schemeClr val="lt1"/>
+                </a:fontRef>
+              </p:style>
+              <p:txBody>
+                <a:bodyPr rtlCol="0" anchor="ctr"/>
+                <a:lstStyle/>
+                <a:p>
+                  <a:pPr algn="ctr"/>
+                  <a:endParaRPr lang="en-US"/>
+                </a:p>
+              </p:txBody>
+            </p:sp>
+            <p:sp>
+              <p:nvSpPr>
+                <p:cNvPr id="67" name="TextBox 66"/>
+                <p:cNvSpPr txBox="1"/>
+                <p:nvPr/>
+              </p:nvSpPr>
+              <p:spPr>
+                <a:xfrm>
+                  <a:off x="6101072" y="821391"/>
+                  <a:ext cx="1647318" cy="369332"/>
+                </a:xfrm>
+                <a:prstGeom prst="rect">
+                  <a:avLst/>
+                </a:prstGeom>
+                <a:noFill/>
+              </p:spPr>
+              <p:txBody>
+                <a:bodyPr wrap="square" rtlCol="0">
+                  <a:spAutoFit/>
+                </a:bodyPr>
+                <a:lstStyle/>
+                <a:p>
+                  <a:r>
+                    <a:rPr lang="en-US" dirty="0" smtClean="0"/>
+                    <a:t>Documentation</a:t>
+                  </a:r>
+                  <a:endParaRPr lang="en-US" dirty="0"/>
+                </a:p>
+              </p:txBody>
+            </p:sp>
+          </p:grpSp>
+          <p:grpSp>
+            <p:nvGrpSpPr>
+              <p:cNvPr id="59" name="Group 58"/>
+              <p:cNvGrpSpPr/>
+              <p:nvPr/>
+            </p:nvGrpSpPr>
+            <p:grpSpPr>
+              <a:xfrm>
+                <a:off x="752680" y="657734"/>
+                <a:ext cx="1647318" cy="717656"/>
+                <a:chOff x="752680" y="657734"/>
+                <a:chExt cx="1647318" cy="717656"/>
+              </a:xfrm>
+            </p:grpSpPr>
+            <p:sp>
+              <p:nvSpPr>
+                <p:cNvPr id="64" name="Rectangle 63"/>
+                <p:cNvSpPr/>
+                <p:nvPr/>
+              </p:nvSpPr>
+              <p:spPr>
+                <a:xfrm>
+                  <a:off x="771095" y="657734"/>
+                  <a:ext cx="1620000" cy="717656"/>
+                </a:xfrm>
+                <a:prstGeom prst="rect">
+                  <a:avLst/>
+                </a:prstGeom>
+                <a:noFill/>
+                <a:ln>
+                  <a:solidFill>
+                    <a:schemeClr val="tx1"/>
+                  </a:solidFill>
+                </a:ln>
+              </p:spPr>
+              <p:style>
+                <a:lnRef idx="1">
+                  <a:schemeClr val="accent1"/>
+                </a:lnRef>
+                <a:fillRef idx="3">
+                  <a:schemeClr val="accent1"/>
+                </a:fillRef>
+                <a:effectRef idx="2">
+                  <a:schemeClr val="accent1"/>
+                </a:effectRef>
+                <a:fontRef idx="minor">
+                  <a:schemeClr val="lt1"/>
+                </a:fontRef>
+              </p:style>
+              <p:txBody>
+                <a:bodyPr rtlCol="0" anchor="ctr"/>
+                <a:lstStyle/>
+                <a:p>
+                  <a:pPr algn="ctr"/>
+                  <a:endParaRPr lang="en-US"/>
+                </a:p>
+              </p:txBody>
+            </p:sp>
+            <p:sp>
+              <p:nvSpPr>
+                <p:cNvPr id="65" name="TextBox 64"/>
+                <p:cNvSpPr txBox="1"/>
+                <p:nvPr/>
+              </p:nvSpPr>
+              <p:spPr>
+                <a:xfrm>
+                  <a:off x="752680" y="682891"/>
+                  <a:ext cx="1647318" cy="646331"/>
+                </a:xfrm>
+                <a:prstGeom prst="rect">
+                  <a:avLst/>
+                </a:prstGeom>
+                <a:noFill/>
+              </p:spPr>
+              <p:txBody>
+                <a:bodyPr wrap="square" rtlCol="0">
+                  <a:spAutoFit/>
+                </a:bodyPr>
+                <a:lstStyle/>
+                <a:p>
+                  <a:pPr algn="ctr"/>
+                  <a:r>
+                    <a:rPr lang="en-US" dirty="0"/>
+                    <a:t>Guides Page</a:t>
+                  </a:r>
+                </a:p>
+                <a:p>
+                  <a:pPr algn="ctr"/>
+                  <a:r>
+                    <a:rPr lang="en-US" dirty="0"/>
+                    <a:t>(Home Page)</a:t>
+                  </a:r>
+                  <a:endParaRPr lang="en-US" dirty="0"/>
+                </a:p>
+              </p:txBody>
+            </p:sp>
+          </p:grpSp>
+          <p:grpSp>
+            <p:nvGrpSpPr>
+              <p:cNvPr id="60" name="Group 59"/>
+              <p:cNvGrpSpPr/>
+              <p:nvPr/>
+            </p:nvGrpSpPr>
+            <p:grpSpPr>
+              <a:xfrm>
+                <a:off x="1587549" y="345183"/>
+                <a:ext cx="5368633" cy="317527"/>
+                <a:chOff x="1587549" y="345183"/>
+                <a:chExt cx="5368633" cy="317527"/>
+              </a:xfrm>
+            </p:grpSpPr>
+            <p:cxnSp>
+              <p:nvCxnSpPr>
+                <p:cNvPr id="61" name="Straight Arrow Connector 60"/>
+                <p:cNvCxnSpPr/>
+                <p:nvPr/>
+              </p:nvCxnSpPr>
+              <p:spPr>
+                <a:xfrm>
+                  <a:off x="1587549" y="345183"/>
+                  <a:ext cx="0" cy="317527"/>
+                </a:xfrm>
+                <a:prstGeom prst="straightConnector1">
+                  <a:avLst/>
+                </a:prstGeom>
+                <a:ln>
+                  <a:solidFill>
+                    <a:srgbClr val="000000"/>
+                  </a:solidFill>
+                  <a:tailEnd type="arrow"/>
+                </a:ln>
+              </p:spPr>
+              <p:style>
+                <a:lnRef idx="2">
+                  <a:schemeClr val="accent1"/>
+                </a:lnRef>
+                <a:fillRef idx="0">
+                  <a:schemeClr val="accent1"/>
+                </a:fillRef>
+                <a:effectRef idx="1">
+                  <a:schemeClr val="accent1"/>
+                </a:effectRef>
+                <a:fontRef idx="minor">
+                  <a:schemeClr val="tx1"/>
+                </a:fontRef>
+              </p:style>
+            </p:cxnSp>
+            <p:cxnSp>
+              <p:nvCxnSpPr>
+                <p:cNvPr id="62" name="Straight Arrow Connector 61"/>
+                <p:cNvCxnSpPr/>
+                <p:nvPr/>
+              </p:nvCxnSpPr>
+              <p:spPr>
+                <a:xfrm>
+                  <a:off x="6956182" y="345183"/>
+                  <a:ext cx="0" cy="317527"/>
+                </a:xfrm>
+                <a:prstGeom prst="straightConnector1">
+                  <a:avLst/>
+                </a:prstGeom>
+                <a:ln>
+                  <a:solidFill>
+                    <a:srgbClr val="000000"/>
+                  </a:solidFill>
+                  <a:tailEnd type="arrow"/>
+                </a:ln>
+              </p:spPr>
+              <p:style>
+                <a:lnRef idx="2">
+                  <a:schemeClr val="accent1"/>
+                </a:lnRef>
+                <a:fillRef idx="0">
+                  <a:schemeClr val="accent1"/>
+                </a:fillRef>
+                <a:effectRef idx="1">
+                  <a:schemeClr val="accent1"/>
+                </a:effectRef>
+                <a:fontRef idx="minor">
+                  <a:schemeClr val="tx1"/>
+                </a:fontRef>
+              </p:style>
+            </p:cxnSp>
+            <p:cxnSp>
+              <p:nvCxnSpPr>
+                <p:cNvPr id="63" name="Straight Connector 62"/>
+                <p:cNvCxnSpPr/>
+                <p:nvPr/>
+              </p:nvCxnSpPr>
+              <p:spPr>
+                <a:xfrm>
+                  <a:off x="1587549" y="345183"/>
+                  <a:ext cx="5368633" cy="0"/>
+                </a:xfrm>
+                <a:prstGeom prst="line">
+                  <a:avLst/>
+                </a:prstGeom>
+                <a:ln>
+                  <a:solidFill>
+                    <a:srgbClr val="000000"/>
+                  </a:solidFill>
+                </a:ln>
+              </p:spPr>
+              <p:style>
+                <a:lnRef idx="2">
+                  <a:schemeClr val="accent1"/>
+                </a:lnRef>
+                <a:fillRef idx="0">
+                  <a:schemeClr val="accent1"/>
+                </a:fillRef>
+                <a:effectRef idx="1">
+                  <a:schemeClr val="accent1"/>
+                </a:effectRef>
+                <a:fontRef idx="minor">
+                  <a:schemeClr val="tx1"/>
+                </a:fontRef>
+              </p:style>
+            </p:cxnSp>
+          </p:grpSp>
+        </p:grpSp>
+      </p:grpSp>
+      <p:cxnSp>
+        <p:nvCxnSpPr>
+          <p:cNvPr id="71" name="Straight Arrow Connector 70"/>
+          <p:cNvCxnSpPr/>
+          <p:nvPr/>
+        </p:nvCxnSpPr>
+        <p:spPr>
+          <a:xfrm>
+            <a:off x="1632278" y="1788076"/>
+            <a:ext cx="0" cy="317527"/>
+          </a:xfrm>
+          <a:prstGeom prst="straightConnector1">
+            <a:avLst/>
+          </a:prstGeom>
+          <a:ln>
+            <a:solidFill>
+              <a:srgbClr val="000000"/>
+            </a:solidFill>
+            <a:tailEnd type="arrow"/>
+          </a:ln>
+        </p:spPr>
+        <p:style>
+          <a:lnRef idx="2">
+            <a:schemeClr val="accent1"/>
+          </a:lnRef>
+          <a:fillRef idx="0">
+            <a:schemeClr val="accent1"/>
+          </a:fillRef>
+          <a:effectRef idx="1">
+            <a:schemeClr val="accent1"/>
+          </a:effectRef>
+          <a:fontRef idx="minor">
+            <a:schemeClr val="tx1"/>
+          </a:fontRef>
+        </p:style>
+      </p:cxnSp>
+      <p:cxnSp>
+        <p:nvCxnSpPr>
+          <p:cNvPr id="72" name="Straight Arrow Connector 71"/>
+          <p:cNvCxnSpPr/>
+          <p:nvPr/>
+        </p:nvCxnSpPr>
+        <p:spPr>
+          <a:xfrm>
+            <a:off x="7590218" y="1788303"/>
+            <a:ext cx="0" cy="317527"/>
+          </a:xfrm>
+          <a:prstGeom prst="straightConnector1">
+            <a:avLst/>
+          </a:prstGeom>
+          <a:ln>
+            <a:solidFill>
+              <a:srgbClr val="000000"/>
+            </a:solidFill>
+            <a:tailEnd type="arrow"/>
+          </a:ln>
+        </p:spPr>
+        <p:style>
+          <a:lnRef idx="2">
+            <a:schemeClr val="accent1"/>
+          </a:lnRef>
+          <a:fillRef idx="0">
+            <a:schemeClr val="accent1"/>
+          </a:fillRef>
+          <a:effectRef idx="1">
+            <a:schemeClr val="accent1"/>
+          </a:effectRef>
+          <a:fontRef idx="minor">
+            <a:schemeClr val="tx1"/>
+          </a:fontRef>
+        </p:style>
+      </p:cxnSp>
+      <p:cxnSp>
+        <p:nvCxnSpPr>
+          <p:cNvPr id="73" name="Straight Arrow Connector 72"/>
+          <p:cNvCxnSpPr/>
+          <p:nvPr/>
+        </p:nvCxnSpPr>
+        <p:spPr>
+          <a:xfrm>
+            <a:off x="2816238" y="1788303"/>
+            <a:ext cx="0" cy="317527"/>
+          </a:xfrm>
+          <a:prstGeom prst="straightConnector1">
+            <a:avLst/>
+          </a:prstGeom>
+          <a:ln>
+            <a:solidFill>
+              <a:srgbClr val="000000"/>
+            </a:solidFill>
+            <a:tailEnd type="arrow"/>
+          </a:ln>
+        </p:spPr>
+        <p:style>
+          <a:lnRef idx="2">
+            <a:schemeClr val="accent1"/>
+          </a:lnRef>
+          <a:fillRef idx="0">
+            <a:schemeClr val="accent1"/>
+          </a:fillRef>
+          <a:effectRef idx="1">
+            <a:schemeClr val="accent1"/>
+          </a:effectRef>
+          <a:fontRef idx="minor">
+            <a:schemeClr val="tx1"/>
+          </a:fontRef>
+        </p:style>
+      </p:cxnSp>
+      <p:cxnSp>
+        <p:nvCxnSpPr>
+          <p:cNvPr id="74" name="Straight Connector 73"/>
+          <p:cNvCxnSpPr/>
+          <p:nvPr/>
+        </p:nvCxnSpPr>
+        <p:spPr>
+          <a:xfrm flipV="1">
+            <a:off x="1611725" y="1786792"/>
+            <a:ext cx="5978493" cy="1284"/>
+          </a:xfrm>
+          <a:prstGeom prst="line">
+            <a:avLst/>
+          </a:prstGeom>
+          <a:ln>
+            <a:solidFill>
+              <a:srgbClr val="000000"/>
+            </a:solidFill>
+          </a:ln>
+        </p:spPr>
+        <p:style>
+          <a:lnRef idx="2">
+            <a:schemeClr val="accent1"/>
+          </a:lnRef>
+          <a:fillRef idx="0">
+            <a:schemeClr val="accent1"/>
+          </a:fillRef>
+          <a:effectRef idx="1">
+            <a:schemeClr val="accent1"/>
+          </a:effectRef>
+          <a:fontRef idx="minor">
+            <a:schemeClr val="tx1"/>
+          </a:fontRef>
+        </p:style>
+      </p:cxnSp>
+      <p:cxnSp>
+        <p:nvCxnSpPr>
+          <p:cNvPr id="76" name="Straight Arrow Connector 75"/>
+          <p:cNvCxnSpPr/>
+          <p:nvPr/>
+        </p:nvCxnSpPr>
+        <p:spPr>
+          <a:xfrm>
+            <a:off x="4013298" y="1788303"/>
+            <a:ext cx="0" cy="317527"/>
+          </a:xfrm>
+          <a:prstGeom prst="straightConnector1">
+            <a:avLst/>
+          </a:prstGeom>
+          <a:ln>
+            <a:solidFill>
+              <a:srgbClr val="000000"/>
+            </a:solidFill>
+            <a:tailEnd type="arrow"/>
+          </a:ln>
+        </p:spPr>
+        <p:style>
+          <a:lnRef idx="2">
+            <a:schemeClr val="accent1"/>
+          </a:lnRef>
+          <a:fillRef idx="0">
+            <a:schemeClr val="accent1"/>
+          </a:fillRef>
+          <a:effectRef idx="1">
+            <a:schemeClr val="accent1"/>
+          </a:effectRef>
+          <a:fontRef idx="minor">
+            <a:schemeClr val="tx1"/>
+          </a:fontRef>
+        </p:style>
+      </p:cxnSp>
+      <p:cxnSp>
+        <p:nvCxnSpPr>
+          <p:cNvPr id="77" name="Straight Arrow Connector 76"/>
+          <p:cNvCxnSpPr/>
+          <p:nvPr/>
+        </p:nvCxnSpPr>
+        <p:spPr>
+          <a:xfrm>
+            <a:off x="5198085" y="1786792"/>
+            <a:ext cx="0" cy="317527"/>
+          </a:xfrm>
+          <a:prstGeom prst="straightConnector1">
+            <a:avLst/>
+          </a:prstGeom>
+          <a:ln>
+            <a:solidFill>
+              <a:srgbClr val="000000"/>
+            </a:solidFill>
+            <a:tailEnd type="arrow"/>
+          </a:ln>
+        </p:spPr>
+        <p:style>
+          <a:lnRef idx="2">
+            <a:schemeClr val="accent1"/>
+          </a:lnRef>
+          <a:fillRef idx="0">
+            <a:schemeClr val="accent1"/>
+          </a:fillRef>
+          <a:effectRef idx="1">
+            <a:schemeClr val="accent1"/>
+          </a:effectRef>
+          <a:fontRef idx="minor">
+            <a:schemeClr val="tx1"/>
+          </a:fontRef>
+        </p:style>
+      </p:cxnSp>
+      <p:cxnSp>
+        <p:nvCxnSpPr>
+          <p:cNvPr id="78" name="Straight Arrow Connector 77"/>
+          <p:cNvCxnSpPr/>
+          <p:nvPr/>
+        </p:nvCxnSpPr>
+        <p:spPr>
+          <a:xfrm>
+            <a:off x="6394086" y="1776550"/>
+            <a:ext cx="0" cy="317527"/>
+          </a:xfrm>
+          <a:prstGeom prst="straightConnector1">
+            <a:avLst/>
+          </a:prstGeom>
+          <a:ln>
+            <a:solidFill>
+              <a:srgbClr val="000000"/>
+            </a:solidFill>
+            <a:tailEnd type="arrow"/>
+          </a:ln>
+        </p:spPr>
+        <p:style>
+          <a:lnRef idx="2">
+            <a:schemeClr val="accent1"/>
+          </a:lnRef>
+          <a:fillRef idx="0">
+            <a:schemeClr val="accent1"/>
+          </a:fillRef>
+          <a:effectRef idx="1">
+            <a:schemeClr val="accent1"/>
+          </a:effectRef>
+          <a:fontRef idx="minor">
+            <a:schemeClr val="tx1"/>
+          </a:fontRef>
+        </p:style>
+      </p:cxnSp>
+      <p:grpSp>
+        <p:nvGrpSpPr>
+          <p:cNvPr id="81" name="Group 80"/>
+          <p:cNvGrpSpPr/>
+          <p:nvPr/>
+        </p:nvGrpSpPr>
+        <p:grpSpPr>
+          <a:xfrm>
+            <a:off x="1019348" y="2105603"/>
+            <a:ext cx="1194270" cy="826972"/>
+            <a:chOff x="1019348" y="2504019"/>
+            <a:chExt cx="1194270" cy="826972"/>
+          </a:xfrm>
+        </p:grpSpPr>
+        <p:sp>
+          <p:nvSpPr>
+            <p:cNvPr id="79" name="Diamond 78"/>
+            <p:cNvSpPr/>
+            <p:nvPr/>
+          </p:nvSpPr>
+          <p:spPr>
+            <a:xfrm>
+              <a:off x="1019348" y="2504019"/>
+              <a:ext cx="1194270" cy="826972"/>
+            </a:xfrm>
+            <a:prstGeom prst="diamond">
+              <a:avLst/>
+            </a:prstGeom>
+            <a:noFill/>
+            <a:ln>
+              <a:solidFill>
+                <a:srgbClr val="000000"/>
+              </a:solidFill>
+            </a:ln>
+          </p:spPr>
+          <p:style>
+            <a:lnRef idx="1">
+              <a:schemeClr val="accent1"/>
+            </a:lnRef>
+            <a:fillRef idx="3">
+              <a:schemeClr val="accent1"/>
+            </a:fillRef>
+            <a:effectRef idx="2">
+              <a:schemeClr val="accent1"/>
+            </a:effectRef>
+            <a:fontRef idx="minor">
+              <a:schemeClr val="lt1"/>
+            </a:fontRef>
+          </p:style>
+          <p:txBody>
+            <a:bodyPr rtlCol="0" anchor="ctr"/>
+            <a:lstStyle/>
+            <a:p>
+              <a:pPr algn="ctr"/>
+              <a:endParaRPr lang="en-US"/>
+            </a:p>
+          </p:txBody>
+        </p:sp>
+        <p:sp>
+          <p:nvSpPr>
+            <p:cNvPr id="80" name="TextBox 79"/>
+            <p:cNvSpPr txBox="1"/>
+            <p:nvPr/>
+          </p:nvSpPr>
+          <p:spPr>
+            <a:xfrm>
+              <a:off x="1148454" y="2734494"/>
+              <a:ext cx="1044678" cy="307777"/>
+            </a:xfrm>
+            <a:prstGeom prst="rect">
+              <a:avLst/>
+            </a:prstGeom>
+            <a:noFill/>
+          </p:spPr>
+          <p:txBody>
+            <a:bodyPr wrap="square" rtlCol="0">
+              <a:spAutoFit/>
+            </a:bodyPr>
+            <a:lstStyle/>
+            <a:p>
+              <a:r>
+                <a:rPr lang="en-US" sz="1400" dirty="0" smtClean="0"/>
+                <a:t>Vegetables</a:t>
+              </a:r>
+              <a:endParaRPr lang="en-US" sz="1400" dirty="0"/>
+            </a:p>
+          </p:txBody>
+        </p:sp>
+      </p:grpSp>
+      <p:grpSp>
+        <p:nvGrpSpPr>
+          <p:cNvPr id="82" name="Group 81"/>
+          <p:cNvGrpSpPr/>
+          <p:nvPr/>
+        </p:nvGrpSpPr>
+        <p:grpSpPr>
+          <a:xfrm>
+            <a:off x="2221297" y="2105830"/>
+            <a:ext cx="1319800" cy="826972"/>
+            <a:chOff x="1019348" y="2504019"/>
+            <a:chExt cx="1319800" cy="826972"/>
+          </a:xfrm>
+        </p:grpSpPr>
+        <p:sp>
+          <p:nvSpPr>
+            <p:cNvPr id="83" name="Diamond 82"/>
+            <p:cNvSpPr/>
+            <p:nvPr/>
+          </p:nvSpPr>
+          <p:spPr>
+            <a:xfrm>
+              <a:off x="1019348" y="2504019"/>
+              <a:ext cx="1194270" cy="826972"/>
+            </a:xfrm>
+            <a:prstGeom prst="diamond">
+              <a:avLst/>
+            </a:prstGeom>
+            <a:noFill/>
+            <a:ln>
+              <a:solidFill>
+                <a:srgbClr val="000000"/>
+              </a:solidFill>
+            </a:ln>
+          </p:spPr>
+          <p:style>
+            <a:lnRef idx="1">
+              <a:schemeClr val="accent1"/>
+            </a:lnRef>
+            <a:fillRef idx="3">
+              <a:schemeClr val="accent1"/>
+            </a:fillRef>
+            <a:effectRef idx="2">
+              <a:schemeClr val="accent1"/>
+            </a:effectRef>
+            <a:fontRef idx="minor">
+              <a:schemeClr val="lt1"/>
+            </a:fontRef>
+          </p:style>
+          <p:txBody>
+            <a:bodyPr rtlCol="0" anchor="ctr"/>
+            <a:lstStyle/>
+            <a:p>
+              <a:pPr algn="ctr"/>
+              <a:endParaRPr lang="en-US"/>
+            </a:p>
+          </p:txBody>
+        </p:sp>
+        <p:sp>
+          <p:nvSpPr>
+            <p:cNvPr id="84" name="TextBox 83"/>
+            <p:cNvSpPr txBox="1"/>
+            <p:nvPr/>
+          </p:nvSpPr>
+          <p:spPr>
+            <a:xfrm>
+              <a:off x="1294470" y="2734494"/>
+              <a:ext cx="1044678" cy="307777"/>
+            </a:xfrm>
+            <a:prstGeom prst="rect">
+              <a:avLst/>
+            </a:prstGeom>
+            <a:noFill/>
+          </p:spPr>
+          <p:txBody>
+            <a:bodyPr wrap="square" rtlCol="0">
+              <a:spAutoFit/>
+            </a:bodyPr>
+            <a:lstStyle/>
+            <a:p>
+              <a:r>
+                <a:rPr lang="en-US" sz="1400" dirty="0" smtClean="0"/>
+                <a:t>Fruits</a:t>
+              </a:r>
+              <a:endParaRPr lang="en-US" sz="1400" dirty="0"/>
+            </a:p>
+          </p:txBody>
+        </p:sp>
+      </p:grpSp>
+      <p:grpSp>
+        <p:nvGrpSpPr>
+          <p:cNvPr id="85" name="Group 84"/>
+          <p:cNvGrpSpPr/>
+          <p:nvPr/>
+        </p:nvGrpSpPr>
+        <p:grpSpPr>
+          <a:xfrm>
+            <a:off x="3420361" y="2104319"/>
+            <a:ext cx="1422722" cy="826972"/>
+            <a:chOff x="1019348" y="2504019"/>
+            <a:chExt cx="1422722" cy="826972"/>
+          </a:xfrm>
+        </p:grpSpPr>
+        <p:sp>
+          <p:nvSpPr>
+            <p:cNvPr id="86" name="Diamond 85"/>
+            <p:cNvSpPr/>
+            <p:nvPr/>
+          </p:nvSpPr>
+          <p:spPr>
+            <a:xfrm>
+              <a:off x="1019348" y="2504019"/>
+              <a:ext cx="1194270" cy="826972"/>
+            </a:xfrm>
+            <a:prstGeom prst="diamond">
+              <a:avLst/>
+            </a:prstGeom>
+            <a:noFill/>
+            <a:ln>
+              <a:solidFill>
+                <a:srgbClr val="000000"/>
+              </a:solidFill>
+            </a:ln>
+          </p:spPr>
+          <p:style>
+            <a:lnRef idx="1">
+              <a:schemeClr val="accent1"/>
+            </a:lnRef>
+            <a:fillRef idx="3">
+              <a:schemeClr val="accent1"/>
+            </a:fillRef>
+            <a:effectRef idx="2">
+              <a:schemeClr val="accent1"/>
+            </a:effectRef>
+            <a:fontRef idx="minor">
+              <a:schemeClr val="lt1"/>
+            </a:fontRef>
+          </p:style>
+          <p:txBody>
+            <a:bodyPr rtlCol="0" anchor="ctr"/>
+            <a:lstStyle/>
+            <a:p>
+              <a:pPr algn="ctr"/>
+              <a:endParaRPr lang="en-US"/>
+            </a:p>
+          </p:txBody>
+        </p:sp>
+        <p:sp>
+          <p:nvSpPr>
+            <p:cNvPr id="87" name="TextBox 86"/>
+            <p:cNvSpPr txBox="1"/>
+            <p:nvPr/>
+          </p:nvSpPr>
+          <p:spPr>
+            <a:xfrm>
+              <a:off x="1397392" y="2714010"/>
+              <a:ext cx="1044678" cy="307777"/>
+            </a:xfrm>
+            <a:prstGeom prst="rect">
+              <a:avLst/>
+            </a:prstGeom>
+            <a:noFill/>
+          </p:spPr>
+          <p:txBody>
+            <a:bodyPr wrap="square" rtlCol="0">
+              <a:spAutoFit/>
+            </a:bodyPr>
+            <a:lstStyle/>
+            <a:p>
+              <a:r>
+                <a:rPr lang="en-US" sz="1400" dirty="0" smtClean="0"/>
+                <a:t>Soil</a:t>
+              </a:r>
+              <a:endParaRPr lang="en-US" sz="1400" dirty="0"/>
+            </a:p>
+          </p:txBody>
+        </p:sp>
+      </p:grpSp>
+      <p:grpSp>
+        <p:nvGrpSpPr>
+          <p:cNvPr id="88" name="Group 87"/>
+          <p:cNvGrpSpPr/>
+          <p:nvPr/>
+        </p:nvGrpSpPr>
+        <p:grpSpPr>
+          <a:xfrm>
+            <a:off x="4604762" y="2105603"/>
+            <a:ext cx="1194270" cy="826972"/>
+            <a:chOff x="1019348" y="2504019"/>
+            <a:chExt cx="1194270" cy="826972"/>
+          </a:xfrm>
+        </p:grpSpPr>
+        <p:sp>
+          <p:nvSpPr>
+            <p:cNvPr id="89" name="Diamond 88"/>
+            <p:cNvSpPr/>
+            <p:nvPr/>
+          </p:nvSpPr>
+          <p:spPr>
+            <a:xfrm>
+              <a:off x="1019348" y="2504019"/>
+              <a:ext cx="1194270" cy="826972"/>
+            </a:xfrm>
+            <a:prstGeom prst="diamond">
+              <a:avLst/>
+            </a:prstGeom>
+            <a:noFill/>
+            <a:ln>
+              <a:solidFill>
+                <a:srgbClr val="000000"/>
+              </a:solidFill>
+            </a:ln>
+          </p:spPr>
+          <p:style>
+            <a:lnRef idx="1">
+              <a:schemeClr val="accent1"/>
+            </a:lnRef>
+            <a:fillRef idx="3">
+              <a:schemeClr val="accent1"/>
+            </a:fillRef>
+            <a:effectRef idx="2">
+              <a:schemeClr val="accent1"/>
+            </a:effectRef>
+            <a:fontRef idx="minor">
+              <a:schemeClr val="lt1"/>
+            </a:fontRef>
+          </p:style>
+          <p:txBody>
+            <a:bodyPr rtlCol="0" anchor="ctr"/>
+            <a:lstStyle/>
+            <a:p>
+              <a:pPr algn="ctr"/>
+              <a:endParaRPr lang="en-US"/>
+            </a:p>
+          </p:txBody>
+        </p:sp>
+        <p:sp>
+          <p:nvSpPr>
+            <p:cNvPr id="90" name="TextBox 89"/>
+            <p:cNvSpPr txBox="1"/>
+            <p:nvPr/>
+          </p:nvSpPr>
+          <p:spPr>
+            <a:xfrm>
+              <a:off x="1148454" y="2734494"/>
+              <a:ext cx="1044678" cy="307777"/>
+            </a:xfrm>
+            <a:prstGeom prst="rect">
+              <a:avLst/>
+            </a:prstGeom>
+            <a:noFill/>
+          </p:spPr>
+          <p:txBody>
+            <a:bodyPr wrap="square" rtlCol="0">
+              <a:spAutoFit/>
+            </a:bodyPr>
+            <a:lstStyle/>
+            <a:p>
+              <a:r>
+                <a:rPr lang="en-US" sz="1400" dirty="0" smtClean="0"/>
+                <a:t>Fertilization</a:t>
+              </a:r>
+              <a:endParaRPr lang="en-US" sz="1400" dirty="0"/>
+            </a:p>
+          </p:txBody>
+        </p:sp>
+      </p:grpSp>
+      <p:grpSp>
+        <p:nvGrpSpPr>
+          <p:cNvPr id="91" name="Group 90"/>
+          <p:cNvGrpSpPr/>
+          <p:nvPr/>
+        </p:nvGrpSpPr>
+        <p:grpSpPr>
+          <a:xfrm>
+            <a:off x="5798257" y="2105716"/>
+            <a:ext cx="1287665" cy="826972"/>
+            <a:chOff x="1019348" y="2504019"/>
+            <a:chExt cx="1287665" cy="826972"/>
+          </a:xfrm>
+        </p:grpSpPr>
+        <p:sp>
+          <p:nvSpPr>
+            <p:cNvPr id="92" name="Diamond 91"/>
+            <p:cNvSpPr/>
+            <p:nvPr/>
+          </p:nvSpPr>
+          <p:spPr>
+            <a:xfrm>
+              <a:off x="1019348" y="2504019"/>
+              <a:ext cx="1194270" cy="826972"/>
+            </a:xfrm>
+            <a:prstGeom prst="diamond">
+              <a:avLst/>
+            </a:prstGeom>
+            <a:noFill/>
+            <a:ln>
+              <a:solidFill>
+                <a:srgbClr val="000000"/>
+              </a:solidFill>
+            </a:ln>
+          </p:spPr>
+          <p:style>
+            <a:lnRef idx="1">
+              <a:schemeClr val="accent1"/>
+            </a:lnRef>
+            <a:fillRef idx="3">
+              <a:schemeClr val="accent1"/>
+            </a:fillRef>
+            <a:effectRef idx="2">
+              <a:schemeClr val="accent1"/>
+            </a:effectRef>
+            <a:fontRef idx="minor">
+              <a:schemeClr val="lt1"/>
+            </a:fontRef>
+          </p:style>
+          <p:txBody>
+            <a:bodyPr rtlCol="0" anchor="ctr"/>
+            <a:lstStyle/>
+            <a:p>
+              <a:pPr algn="ctr"/>
+              <a:endParaRPr lang="en-US"/>
+            </a:p>
+          </p:txBody>
+        </p:sp>
+        <p:sp>
+          <p:nvSpPr>
+            <p:cNvPr id="93" name="TextBox 92"/>
+            <p:cNvSpPr txBox="1"/>
+            <p:nvPr/>
+          </p:nvSpPr>
+          <p:spPr>
+            <a:xfrm>
+              <a:off x="1262335" y="2734494"/>
+              <a:ext cx="1044678" cy="307777"/>
+            </a:xfrm>
+            <a:prstGeom prst="rect">
+              <a:avLst/>
+            </a:prstGeom>
+            <a:noFill/>
+          </p:spPr>
+          <p:txBody>
+            <a:bodyPr wrap="square" rtlCol="0">
+              <a:spAutoFit/>
+            </a:bodyPr>
+            <a:lstStyle/>
+            <a:p>
+              <a:r>
+                <a:rPr lang="en-US" sz="1400" dirty="0" smtClean="0"/>
+                <a:t>Irrigation</a:t>
+              </a:r>
+              <a:endParaRPr lang="en-US" sz="1400" dirty="0"/>
+            </a:p>
+          </p:txBody>
+        </p:sp>
+      </p:grpSp>
+      <p:grpSp>
+        <p:nvGrpSpPr>
+          <p:cNvPr id="94" name="Group 93"/>
+          <p:cNvGrpSpPr/>
+          <p:nvPr/>
+        </p:nvGrpSpPr>
+        <p:grpSpPr>
+          <a:xfrm>
+            <a:off x="6992527" y="2105830"/>
+            <a:ext cx="1407942" cy="826972"/>
+            <a:chOff x="1019348" y="2504019"/>
+            <a:chExt cx="1407942" cy="826972"/>
+          </a:xfrm>
+        </p:grpSpPr>
+        <p:sp>
+          <p:nvSpPr>
+            <p:cNvPr id="95" name="Diamond 94"/>
+            <p:cNvSpPr/>
+            <p:nvPr/>
+          </p:nvSpPr>
+          <p:spPr>
+            <a:xfrm>
+              <a:off x="1019348" y="2504019"/>
+              <a:ext cx="1194270" cy="826972"/>
+            </a:xfrm>
+            <a:prstGeom prst="diamond">
+              <a:avLst/>
+            </a:prstGeom>
+            <a:noFill/>
+            <a:ln>
+              <a:solidFill>
+                <a:srgbClr val="000000"/>
+              </a:solidFill>
+            </a:ln>
+          </p:spPr>
+          <p:style>
+            <a:lnRef idx="1">
+              <a:schemeClr val="accent1"/>
+            </a:lnRef>
+            <a:fillRef idx="3">
+              <a:schemeClr val="accent1"/>
+            </a:fillRef>
+            <a:effectRef idx="2">
+              <a:schemeClr val="accent1"/>
+            </a:effectRef>
+            <a:fontRef idx="minor">
+              <a:schemeClr val="lt1"/>
+            </a:fontRef>
+          </p:style>
+          <p:txBody>
+            <a:bodyPr rtlCol="0" anchor="ctr"/>
+            <a:lstStyle/>
+            <a:p>
+              <a:pPr algn="ctr"/>
+              <a:endParaRPr lang="en-US"/>
+            </a:p>
+          </p:txBody>
+        </p:sp>
+        <p:sp>
+          <p:nvSpPr>
+            <p:cNvPr id="96" name="TextBox 95"/>
+            <p:cNvSpPr txBox="1"/>
+            <p:nvPr/>
+          </p:nvSpPr>
+          <p:spPr>
+            <a:xfrm>
+              <a:off x="1382612" y="2734494"/>
+              <a:ext cx="1044678" cy="307777"/>
+            </a:xfrm>
+            <a:prstGeom prst="rect">
+              <a:avLst/>
+            </a:prstGeom>
+            <a:noFill/>
+          </p:spPr>
+          <p:txBody>
+            <a:bodyPr wrap="square" rtlCol="0">
+              <a:spAutoFit/>
+            </a:bodyPr>
+            <a:lstStyle/>
+            <a:p>
+              <a:r>
+                <a:rPr lang="en-US" sz="1400" dirty="0" smtClean="0"/>
+                <a:t>Soil</a:t>
+              </a:r>
+              <a:endParaRPr lang="en-US" sz="1400" dirty="0"/>
+            </a:p>
+          </p:txBody>
+        </p:sp>
+      </p:grpSp>
+      <p:cxnSp>
+        <p:nvCxnSpPr>
+          <p:cNvPr id="99" name="Straight Arrow Connector 98"/>
+          <p:cNvCxnSpPr/>
+          <p:nvPr/>
+        </p:nvCxnSpPr>
+        <p:spPr>
+          <a:xfrm flipV="1">
+            <a:off x="1632278" y="1389887"/>
+            <a:ext cx="0" cy="386663"/>
+          </a:xfrm>
+          <a:prstGeom prst="straightConnector1">
+            <a:avLst/>
+          </a:prstGeom>
+          <a:ln>
+            <a:solidFill>
+              <a:srgbClr val="000000"/>
+            </a:solidFill>
+            <a:tailEnd type="arrow"/>
+          </a:ln>
+        </p:spPr>
+        <p:style>
+          <a:lnRef idx="2">
+            <a:schemeClr val="accent1"/>
+          </a:lnRef>
+          <a:fillRef idx="0">
+            <a:schemeClr val="accent1"/>
+          </a:fillRef>
+          <a:effectRef idx="1">
+            <a:schemeClr val="accent1"/>
+          </a:effectRef>
+          <a:fontRef idx="minor">
+            <a:schemeClr val="tx1"/>
+          </a:fontRef>
+        </p:style>
+      </p:cxnSp>
+      <p:sp>
+        <p:nvSpPr>
+          <p:cNvPr id="102" name="TextBox 101"/>
+          <p:cNvSpPr txBox="1"/>
+          <p:nvPr/>
+        </p:nvSpPr>
+        <p:spPr>
+          <a:xfrm>
+            <a:off x="1791802" y="1449749"/>
+            <a:ext cx="5736366" cy="338554"/>
+          </a:xfrm>
+          <a:prstGeom prst="rect">
+            <a:avLst/>
+          </a:prstGeom>
+          <a:noFill/>
+        </p:spPr>
+        <p:txBody>
+          <a:bodyPr wrap="none" rtlCol="0">
+            <a:spAutoFit/>
+          </a:bodyPr>
+          <a:lstStyle/>
+          <a:p>
+            <a:r>
+              <a:rPr lang="en-US" sz="1600" dirty="0" smtClean="0"/>
+              <a:t>User clicks on links in side bar or scrolls to navigate to each section</a:t>
+            </a:r>
+            <a:endParaRPr lang="en-US" sz="1600" dirty="0"/>
+          </a:p>
+        </p:txBody>
+      </p:sp>
+      <p:sp>
+        <p:nvSpPr>
+          <p:cNvPr id="104" name="TextBox 103"/>
+          <p:cNvSpPr txBox="1"/>
+          <p:nvPr/>
+        </p:nvSpPr>
+        <p:spPr>
+          <a:xfrm>
+            <a:off x="1632278" y="2981614"/>
+            <a:ext cx="3752249" cy="338554"/>
+          </a:xfrm>
+          <a:prstGeom prst="rect">
+            <a:avLst/>
+          </a:prstGeom>
+          <a:noFill/>
+        </p:spPr>
+        <p:txBody>
+          <a:bodyPr wrap="none" rtlCol="0">
+            <a:spAutoFit/>
+          </a:bodyPr>
+          <a:lstStyle/>
+          <a:p>
+            <a:r>
+              <a:rPr lang="en-US" sz="1600" dirty="0" smtClean="0"/>
+              <a:t>User scrolls in section to find specific guide</a:t>
+            </a:r>
+            <a:endParaRPr lang="en-US" sz="1600" dirty="0"/>
+          </a:p>
+        </p:txBody>
+      </p:sp>
+      <p:cxnSp>
+        <p:nvCxnSpPr>
+          <p:cNvPr id="106" name="Straight Arrow Connector 105"/>
+          <p:cNvCxnSpPr/>
+          <p:nvPr/>
+        </p:nvCxnSpPr>
+        <p:spPr>
+          <a:xfrm flipH="1">
+            <a:off x="1611725" y="4650670"/>
+            <a:ext cx="67" cy="400269"/>
+          </a:xfrm>
+          <a:prstGeom prst="straightConnector1">
+            <a:avLst/>
+          </a:prstGeom>
+          <a:ln>
+            <a:solidFill>
+              <a:srgbClr val="000000"/>
+            </a:solidFill>
+            <a:tailEnd type="arrow"/>
+          </a:ln>
+        </p:spPr>
+        <p:style>
+          <a:lnRef idx="2">
+            <a:schemeClr val="accent1"/>
+          </a:lnRef>
+          <a:fillRef idx="0">
+            <a:schemeClr val="accent1"/>
+          </a:fillRef>
+          <a:effectRef idx="1">
+            <a:schemeClr val="accent1"/>
+          </a:effectRef>
+          <a:fontRef idx="minor">
+            <a:schemeClr val="tx1"/>
+          </a:fontRef>
+        </p:style>
+      </p:cxnSp>
+      <p:sp>
+        <p:nvSpPr>
+          <p:cNvPr id="108" name="TextBox 107"/>
+          <p:cNvSpPr txBox="1"/>
+          <p:nvPr/>
+        </p:nvSpPr>
+        <p:spPr>
+          <a:xfrm>
+            <a:off x="1632278" y="4558496"/>
+            <a:ext cx="2073608" cy="492443"/>
+          </a:xfrm>
+          <a:prstGeom prst="rect">
+            <a:avLst/>
+          </a:prstGeom>
+          <a:noFill/>
+        </p:spPr>
+        <p:txBody>
+          <a:bodyPr wrap="square" rtlCol="0">
+            <a:spAutoFit/>
+          </a:bodyPr>
+          <a:lstStyle/>
+          <a:p>
+            <a:r>
+              <a:rPr lang="en-US" sz="1300" dirty="0" smtClean="0"/>
+              <a:t>User chooses Carrot Guide, clicks on Carrot guide title. </a:t>
+            </a:r>
+            <a:endParaRPr lang="en-US" sz="1300" dirty="0"/>
+          </a:p>
+        </p:txBody>
+      </p:sp>
+      <p:sp>
+        <p:nvSpPr>
+          <p:cNvPr id="110" name="Rectangle 109"/>
+          <p:cNvSpPr/>
+          <p:nvPr/>
+        </p:nvSpPr>
+        <p:spPr>
+          <a:xfrm>
+            <a:off x="806483" y="5050935"/>
+            <a:ext cx="1620000" cy="285915"/>
+          </a:xfrm>
+          <a:prstGeom prst="rect">
+            <a:avLst/>
+          </a:prstGeom>
+          <a:noFill/>
+          <a:ln>
+            <a:solidFill>
+              <a:schemeClr val="tx1"/>
+            </a:solidFill>
+          </a:ln>
+        </p:spPr>
+        <p:style>
+          <a:lnRef idx="1">
+            <a:schemeClr val="accent1"/>
+          </a:lnRef>
+          <a:fillRef idx="3">
+            <a:schemeClr val="accent1"/>
+          </a:fillRef>
+          <a:effectRef idx="2">
+            <a:schemeClr val="accent1"/>
+          </a:effectRef>
+          <a:fontRef idx="minor">
+            <a:schemeClr val="lt1"/>
+          </a:fontRef>
+        </p:style>
+        <p:txBody>
+          <a:bodyPr rtlCol="0" anchor="ctr"/>
+          <a:lstStyle/>
+          <a:p>
+            <a:pPr algn="ctr"/>
+            <a:endParaRPr lang="en-US"/>
+          </a:p>
+        </p:txBody>
+      </p:sp>
+      <p:sp>
+        <p:nvSpPr>
+          <p:cNvPr id="111" name="TextBox 110"/>
+          <p:cNvSpPr txBox="1"/>
+          <p:nvPr/>
+        </p:nvSpPr>
+        <p:spPr>
+          <a:xfrm>
+            <a:off x="991833" y="5062025"/>
+            <a:ext cx="1249060" cy="461665"/>
+          </a:xfrm>
+          <a:prstGeom prst="rect">
+            <a:avLst/>
+          </a:prstGeom>
+          <a:noFill/>
+        </p:spPr>
+        <p:txBody>
+          <a:bodyPr wrap="none" rtlCol="0">
+            <a:spAutoFit/>
+          </a:bodyPr>
+          <a:lstStyle/>
+          <a:p>
+            <a:r>
+              <a:rPr lang="en-US" sz="1200" dirty="0" smtClean="0"/>
+              <a:t>Guide on Carrots</a:t>
+            </a:r>
+          </a:p>
+          <a:p>
+            <a:endParaRPr lang="en-US" sz="1200" dirty="0"/>
+          </a:p>
+        </p:txBody>
+      </p:sp>
+      <p:cxnSp>
+        <p:nvCxnSpPr>
+          <p:cNvPr id="112" name="Straight Arrow Connector 111"/>
+          <p:cNvCxnSpPr/>
+          <p:nvPr/>
+        </p:nvCxnSpPr>
+        <p:spPr>
+          <a:xfrm flipH="1">
+            <a:off x="1611725" y="5336850"/>
+            <a:ext cx="4758" cy="674942"/>
+          </a:xfrm>
+          <a:prstGeom prst="straightConnector1">
+            <a:avLst/>
+          </a:prstGeom>
+          <a:ln>
+            <a:solidFill>
+              <a:srgbClr val="000000"/>
+            </a:solidFill>
+            <a:headEnd type="arrow"/>
+            <a:tailEnd type="arrow"/>
+          </a:ln>
+        </p:spPr>
+        <p:style>
+          <a:lnRef idx="2">
+            <a:schemeClr val="accent1"/>
+          </a:lnRef>
+          <a:fillRef idx="0">
+            <a:schemeClr val="accent1"/>
+          </a:fillRef>
+          <a:effectRef idx="1">
+            <a:schemeClr val="accent1"/>
+          </a:effectRef>
+          <a:fontRef idx="minor">
+            <a:schemeClr val="tx1"/>
+          </a:fontRef>
+        </p:style>
+      </p:cxnSp>
+      <p:sp>
+        <p:nvSpPr>
+          <p:cNvPr id="113" name="Diamond 112"/>
+          <p:cNvSpPr/>
+          <p:nvPr/>
+        </p:nvSpPr>
+        <p:spPr>
+          <a:xfrm>
+            <a:off x="1064895" y="6004000"/>
+            <a:ext cx="1089096" cy="680908"/>
+          </a:xfrm>
+          <a:prstGeom prst="diamond">
+            <a:avLst/>
+          </a:prstGeom>
+          <a:noFill/>
+          <a:ln>
+            <a:solidFill>
+              <a:srgbClr val="000000"/>
+            </a:solidFill>
+          </a:ln>
+        </p:spPr>
+        <p:style>
+          <a:lnRef idx="1">
+            <a:schemeClr val="accent1"/>
+          </a:lnRef>
+          <a:fillRef idx="3">
+            <a:schemeClr val="accent1"/>
+          </a:fillRef>
+          <a:effectRef idx="2">
+            <a:schemeClr val="accent1"/>
+          </a:effectRef>
+          <a:fontRef idx="minor">
+            <a:schemeClr val="lt1"/>
+          </a:fontRef>
+        </p:style>
+        <p:txBody>
+          <a:bodyPr rtlCol="0" anchor="ctr"/>
+          <a:lstStyle/>
+          <a:p>
+            <a:pPr algn="ctr"/>
+            <a:endParaRPr lang="en-US"/>
+          </a:p>
+        </p:txBody>
+      </p:sp>
+      <p:cxnSp>
+        <p:nvCxnSpPr>
+          <p:cNvPr id="114" name="Straight Connector 113"/>
+          <p:cNvCxnSpPr/>
+          <p:nvPr/>
+        </p:nvCxnSpPr>
+        <p:spPr>
+          <a:xfrm>
+            <a:off x="1611792" y="5718285"/>
+            <a:ext cx="1286837" cy="0"/>
+          </a:xfrm>
+          <a:prstGeom prst="line">
+            <a:avLst/>
+          </a:prstGeom>
+          <a:ln>
+            <a:solidFill>
+              <a:srgbClr val="000000"/>
+            </a:solidFill>
+          </a:ln>
+        </p:spPr>
+        <p:style>
+          <a:lnRef idx="2">
+            <a:schemeClr val="accent1"/>
+          </a:lnRef>
+          <a:fillRef idx="0">
+            <a:schemeClr val="accent1"/>
+          </a:fillRef>
+          <a:effectRef idx="1">
+            <a:schemeClr val="accent1"/>
+          </a:effectRef>
+          <a:fontRef idx="minor">
+            <a:schemeClr val="tx1"/>
+          </a:fontRef>
+        </p:style>
+      </p:cxnSp>
+      <p:cxnSp>
+        <p:nvCxnSpPr>
+          <p:cNvPr id="115" name="Straight Arrow Connector 114"/>
+          <p:cNvCxnSpPr/>
+          <p:nvPr/>
+        </p:nvCxnSpPr>
+        <p:spPr>
+          <a:xfrm>
+            <a:off x="2888386" y="5718285"/>
+            <a:ext cx="0" cy="270843"/>
+          </a:xfrm>
+          <a:prstGeom prst="straightConnector1">
+            <a:avLst/>
+          </a:prstGeom>
+          <a:ln>
+            <a:solidFill>
+              <a:srgbClr val="000000"/>
+            </a:solidFill>
+            <a:tailEnd type="arrow"/>
+          </a:ln>
+        </p:spPr>
+        <p:style>
+          <a:lnRef idx="2">
+            <a:schemeClr val="accent1"/>
+          </a:lnRef>
+          <a:fillRef idx="0">
+            <a:schemeClr val="accent1"/>
+          </a:fillRef>
+          <a:effectRef idx="1">
+            <a:schemeClr val="accent1"/>
+          </a:effectRef>
+          <a:fontRef idx="minor">
+            <a:schemeClr val="tx1"/>
+          </a:fontRef>
+        </p:style>
+      </p:cxnSp>
+      <p:sp>
+        <p:nvSpPr>
+          <p:cNvPr id="118" name="TextBox 117"/>
+          <p:cNvSpPr txBox="1"/>
+          <p:nvPr/>
+        </p:nvSpPr>
+        <p:spPr>
+          <a:xfrm>
+            <a:off x="1176854" y="6155582"/>
+            <a:ext cx="1126371" cy="523220"/>
+          </a:xfrm>
+          <a:prstGeom prst="rect">
+            <a:avLst/>
+          </a:prstGeom>
+          <a:noFill/>
+        </p:spPr>
+        <p:txBody>
+          <a:bodyPr wrap="square" rtlCol="0">
+            <a:spAutoFit/>
+          </a:bodyPr>
+          <a:lstStyle/>
+          <a:p>
+            <a:r>
+              <a:rPr lang="en-US" sz="900" dirty="0" smtClean="0"/>
+              <a:t>Video guide on</a:t>
+            </a:r>
+          </a:p>
+          <a:p>
+            <a:r>
+              <a:rPr lang="en-US" sz="900" dirty="0" smtClean="0"/>
+              <a:t> Carrots</a:t>
+            </a:r>
+          </a:p>
+          <a:p>
+            <a:endParaRPr lang="en-US" sz="1000" dirty="0"/>
+          </a:p>
+        </p:txBody>
+      </p:sp>
+      <p:sp>
+        <p:nvSpPr>
+          <p:cNvPr id="119" name="Diamond 118"/>
+          <p:cNvSpPr/>
+          <p:nvPr/>
+        </p:nvSpPr>
+        <p:spPr>
+          <a:xfrm>
+            <a:off x="2338954" y="5997894"/>
+            <a:ext cx="1089096" cy="680908"/>
+          </a:xfrm>
+          <a:prstGeom prst="diamond">
+            <a:avLst/>
+          </a:prstGeom>
+          <a:noFill/>
+          <a:ln>
+            <a:solidFill>
+              <a:srgbClr val="000000"/>
+            </a:solidFill>
+          </a:ln>
+        </p:spPr>
+        <p:style>
+          <a:lnRef idx="1">
+            <a:schemeClr val="accent1"/>
+          </a:lnRef>
+          <a:fillRef idx="3">
+            <a:schemeClr val="accent1"/>
+          </a:fillRef>
+          <a:effectRef idx="2">
+            <a:schemeClr val="accent1"/>
+          </a:effectRef>
+          <a:fontRef idx="minor">
+            <a:schemeClr val="lt1"/>
+          </a:fontRef>
+        </p:style>
+        <p:txBody>
+          <a:bodyPr rtlCol="0" anchor="ctr"/>
+          <a:lstStyle/>
+          <a:p>
+            <a:pPr algn="ctr"/>
+            <a:endParaRPr lang="en-US"/>
+          </a:p>
+        </p:txBody>
+      </p:sp>
+      <p:sp>
+        <p:nvSpPr>
+          <p:cNvPr id="120" name="TextBox 119"/>
+          <p:cNvSpPr txBox="1"/>
+          <p:nvPr/>
+        </p:nvSpPr>
+        <p:spPr>
+          <a:xfrm>
+            <a:off x="2478430" y="6124450"/>
+            <a:ext cx="1354560" cy="523220"/>
+          </a:xfrm>
+          <a:prstGeom prst="rect">
+            <a:avLst/>
+          </a:prstGeom>
+          <a:noFill/>
+        </p:spPr>
+        <p:txBody>
+          <a:bodyPr wrap="square" rtlCol="0">
+            <a:spAutoFit/>
+          </a:bodyPr>
+          <a:lstStyle/>
+          <a:p>
+            <a:r>
+              <a:rPr lang="en-US" sz="900" dirty="0" smtClean="0"/>
+              <a:t>Written Guide </a:t>
+            </a:r>
+          </a:p>
+          <a:p>
+            <a:r>
+              <a:rPr lang="en-US" sz="900" dirty="0" smtClean="0"/>
+              <a:t>on Carrots</a:t>
+            </a:r>
+          </a:p>
+          <a:p>
+            <a:endParaRPr lang="en-US" sz="1000" dirty="0"/>
+          </a:p>
+        </p:txBody>
+      </p:sp>
+      <p:sp>
+        <p:nvSpPr>
+          <p:cNvPr id="124" name="TextBox 123"/>
+          <p:cNvSpPr txBox="1"/>
+          <p:nvPr/>
+        </p:nvSpPr>
+        <p:spPr>
+          <a:xfrm>
+            <a:off x="1632278" y="5307882"/>
+            <a:ext cx="2073608" cy="430887"/>
+          </a:xfrm>
+          <a:prstGeom prst="rect">
+            <a:avLst/>
+          </a:prstGeom>
+          <a:noFill/>
+        </p:spPr>
+        <p:txBody>
+          <a:bodyPr wrap="square" rtlCol="0">
+            <a:spAutoFit/>
+          </a:bodyPr>
+          <a:lstStyle/>
+          <a:p>
+            <a:r>
+              <a:rPr lang="en-US" sz="1100" dirty="0" smtClean="0"/>
+              <a:t>User </a:t>
+            </a:r>
+            <a:r>
+              <a:rPr lang="en-US" sz="1100" dirty="0" smtClean="0"/>
+              <a:t>scrolls between video and written guide on article page. </a:t>
+            </a:r>
+            <a:endParaRPr lang="en-US" sz="1100" dirty="0"/>
+          </a:p>
+        </p:txBody>
+      </p:sp>
+    </p:spTree>
+    <p:extLst>
+      <p:ext uri="{BB962C8B-B14F-4D97-AF65-F5344CB8AC3E}">
+        <p14:creationId xmlns:p14="http://schemas.microsoft.com/office/powerpoint/2010/main" val="362361940"/>
       </p:ext>
     </p:extLst>
   </p:cSld>

</xml_diff>